<commit_message>
Updated slides for a bit more detail
</commit_message>
<xml_diff>
--- a/ProjectPresentation.pptx
+++ b/ProjectPresentation.pptx
@@ -5,10 +5,10 @@
     <p:sldMasterId id="2147483658" r:id="rId4"/>
   </p:sldMasterIdLst>
   <p:notesMasterIdLst>
-    <p:notesMasterId r:id="rId30"/>
+    <p:notesMasterId r:id="rId29"/>
   </p:notesMasterIdLst>
   <p:handoutMasterIdLst>
-    <p:handoutMasterId r:id="rId31"/>
+    <p:handoutMasterId r:id="rId30"/>
   </p:handoutMasterIdLst>
   <p:sldIdLst>
     <p:sldId id="400" r:id="rId5"/>
@@ -29,13 +29,12 @@
     <p:sldId id="413" r:id="rId20"/>
     <p:sldId id="415" r:id="rId21"/>
     <p:sldId id="414" r:id="rId22"/>
-    <p:sldId id="416" r:id="rId23"/>
-    <p:sldId id="417" r:id="rId24"/>
-    <p:sldId id="418" r:id="rId25"/>
-    <p:sldId id="419" r:id="rId26"/>
-    <p:sldId id="398" r:id="rId27"/>
-    <p:sldId id="420" r:id="rId28"/>
-    <p:sldId id="286" r:id="rId29"/>
+    <p:sldId id="422" r:id="rId23"/>
+    <p:sldId id="418" r:id="rId24"/>
+    <p:sldId id="423" r:id="rId25"/>
+    <p:sldId id="398" r:id="rId26"/>
+    <p:sldId id="420" r:id="rId27"/>
+    <p:sldId id="286" r:id="rId28"/>
   </p:sldIdLst>
   <p:sldSz cx="12192000" cy="6858000"/>
   <p:notesSz cx="6858000" cy="9144000"/>
@@ -239,7 +238,7 @@
           <a:p>
             <a:fld id="{FC80B55D-A28C-4981-AA30-62D8B2215F35}" type="datetimeFigureOut">
               <a:rPr lang="en-US" smtClean="0"/>
-              <a:t>4/17/2023</a:t>
+              <a:t>4/18/2023</a:t>
             </a:fld>
             <a:endParaRPr lang="en-US" dirty="0"/>
           </a:p>
@@ -416,7 +415,7 @@
           <a:p>
             <a:fld id="{9C3E07F7-7765-40B0-95C6-6F0178FC4D78}" type="datetimeFigureOut">
               <a:rPr lang="en-US" smtClean="0"/>
-              <a:t>4/17/2023</a:t>
+              <a:t>4/18/2023</a:t>
             </a:fld>
             <a:endParaRPr lang="en-US" dirty="0"/>
           </a:p>
@@ -1252,7 +1251,7 @@
           <a:p>
             <a:fld id="{1E6D7BE9-6C4F-48E9-816E-E7C44694421A}" type="slidenum">
               <a:rPr lang="en-US" smtClean="0"/>
-              <a:t>21</a:t>
+              <a:t>20</a:t>
             </a:fld>
             <a:endParaRPr lang="en-US" dirty="0"/>
           </a:p>
@@ -1336,7 +1335,7 @@
           <a:p>
             <a:fld id="{1E6D7BE9-6C4F-48E9-816E-E7C44694421A}" type="slidenum">
               <a:rPr lang="en-US" smtClean="0"/>
-              <a:t>23</a:t>
+              <a:t>22</a:t>
             </a:fld>
             <a:endParaRPr lang="en-US" dirty="0"/>
           </a:p>
@@ -1437,7 +1436,7 @@
           <a:p>
             <a:fld id="{1E6D7BE9-6C4F-48E9-816E-E7C44694421A}" type="slidenum">
               <a:rPr lang="en-US" smtClean="0"/>
-              <a:t>25</a:t>
+              <a:t>24</a:t>
             </a:fld>
             <a:endParaRPr lang="en-US" dirty="0"/>
           </a:p>
@@ -9978,136 +9977,74 @@
       </p:grpSpPr>
       <p:sp>
         <p:nvSpPr>
-          <p:cNvPr id="2" name="Title 1">
-            <a:extLst>
-              <a:ext uri="{FF2B5EF4-FFF2-40B4-BE49-F238E27FC236}">
-                <a16:creationId xmlns:a16="http://schemas.microsoft.com/office/drawing/2014/main" id="{2A3E433D-2AB8-5E83-A18C-0F85BA06AB7D}"/>
-              </a:ext>
-            </a:extLst>
-          </p:cNvPr>
-          <p:cNvSpPr>
-            <a:spLocks noGrp="1"/>
-          </p:cNvSpPr>
-          <p:nvPr>
-            <p:ph type="title"/>
-          </p:nvPr>
-        </p:nvSpPr>
-        <p:spPr>
-          <a:xfrm>
-            <a:off x="913795" y="609600"/>
-            <a:ext cx="10353762" cy="741028"/>
-          </a:xfrm>
-        </p:spPr>
+          <p:cNvPr id="2" name="Text Placeholder 1">
+            <a:extLst>
+              <a:ext uri="{FF2B5EF4-FFF2-40B4-BE49-F238E27FC236}">
+                <a16:creationId xmlns:a16="http://schemas.microsoft.com/office/drawing/2014/main" id="{788D719C-8247-80E8-3AAC-9DFBCCFBC6B0}"/>
+              </a:ext>
+            </a:extLst>
+          </p:cNvPr>
+          <p:cNvSpPr>
+            <a:spLocks noGrp="1"/>
+          </p:cNvSpPr>
+          <p:nvPr>
+            <p:ph type="body" idx="1"/>
+          </p:nvPr>
+        </p:nvSpPr>
+        <p:spPr/>
         <p:txBody>
           <a:bodyPr/>
           <a:lstStyle/>
           <a:p>
-            <a:pPr algn="l"/>
             <a:r>
               <a:rPr lang="en-US" dirty="0"/>
-              <a:t>Data Training</a:t>
-            </a:r>
-          </a:p>
-        </p:txBody>
-      </p:sp>
-      <p:sp>
-        <p:nvSpPr>
-          <p:cNvPr id="3" name="Content Placeholder 2">
-            <a:extLst>
-              <a:ext uri="{FF2B5EF4-FFF2-40B4-BE49-F238E27FC236}">
-                <a16:creationId xmlns:a16="http://schemas.microsoft.com/office/drawing/2014/main" id="{555F7494-3A77-26D8-14AB-35DD7B0E00E2}"/>
-              </a:ext>
-            </a:extLst>
-          </p:cNvPr>
-          <p:cNvSpPr>
-            <a:spLocks noGrp="1"/>
-          </p:cNvSpPr>
-          <p:nvPr>
-            <p:ph idx="1"/>
-          </p:nvPr>
-        </p:nvSpPr>
-        <p:spPr>
-          <a:xfrm>
-            <a:off x="913795" y="1812022"/>
-            <a:ext cx="10353762" cy="3979177"/>
-          </a:xfrm>
-        </p:spPr>
+              <a:t>50-50 Split: 100%</a:t>
+            </a:r>
+          </a:p>
+        </p:txBody>
+      </p:sp>
+      <p:sp>
+        <p:nvSpPr>
+          <p:cNvPr id="4" name="Text Placeholder 3">
+            <a:extLst>
+              <a:ext uri="{FF2B5EF4-FFF2-40B4-BE49-F238E27FC236}">
+                <a16:creationId xmlns:a16="http://schemas.microsoft.com/office/drawing/2014/main" id="{6F206336-545C-FA93-25A4-C5E6E0F96CAB}"/>
+              </a:ext>
+            </a:extLst>
+          </p:cNvPr>
+          <p:cNvSpPr>
+            <a:spLocks noGrp="1"/>
+          </p:cNvSpPr>
+          <p:nvPr>
+            <p:ph type="body" sz="quarter" idx="3"/>
+          </p:nvPr>
+        </p:nvSpPr>
+        <p:spPr/>
         <p:txBody>
           <a:bodyPr/>
           <a:lstStyle/>
           <a:p>
             <a:r>
-              <a:rPr lang="en-US" dirty="0">
-                <a:effectLst>
-                  <a:outerShdw blurRad="38100" dist="38100" dir="2700000" algn="tl">
-                    <a:srgbClr val="000000">
-                      <a:alpha val="43137"/>
-                    </a:srgbClr>
-                  </a:outerShdw>
-                </a:effectLst>
-              </a:rPr>
-              <a:t>80% Training, 20% Testing</a:t>
-            </a:r>
-          </a:p>
-          <a:p>
-            <a:r>
-              <a:rPr lang="en-US" dirty="0">
-                <a:effectLst>
-                  <a:outerShdw blurRad="38100" dist="38100" dir="2700000" algn="tl">
-                    <a:srgbClr val="000000">
-                      <a:alpha val="43137"/>
-                    </a:srgbClr>
-                  </a:outerShdw>
-                </a:effectLst>
-              </a:rPr>
-              <a:t>Data is a time series dataset, so we did not want to randomly split our data</a:t>
-            </a:r>
-          </a:p>
-          <a:p>
-            <a:pPr lvl="1"/>
-            <a:r>
-              <a:rPr lang="en-US" dirty="0">
-                <a:effectLst>
-                  <a:outerShdw blurRad="38100" dist="38100" dir="2700000" algn="tl">
-                    <a:srgbClr val="000000">
-                      <a:alpha val="43137"/>
-                    </a:srgbClr>
-                  </a:outerShdw>
-                </a:effectLst>
-              </a:rPr>
-              <a:t>Hence, the condition ‘shuffle=False’</a:t>
-            </a:r>
-          </a:p>
-          <a:p>
-            <a:r>
-              <a:rPr lang="en-US" dirty="0">
-                <a:effectLst>
-                  <a:outerShdw blurRad="38100" dist="38100" dir="2700000" algn="tl">
-                    <a:srgbClr val="000000">
-                      <a:alpha val="43137"/>
-                    </a:srgbClr>
-                  </a:outerShdw>
-                </a:effectLst>
-              </a:rPr>
-              <a:t>Last 2 years of dataset selected for testing</a:t>
-            </a:r>
-          </a:p>
-        </p:txBody>
-      </p:sp>
-      <p:sp>
-        <p:nvSpPr>
-          <p:cNvPr id="6" name="Slide Number Placeholder 5">
-            <a:extLst>
-              <a:ext uri="{FF2B5EF4-FFF2-40B4-BE49-F238E27FC236}">
-                <a16:creationId xmlns:a16="http://schemas.microsoft.com/office/drawing/2014/main" id="{A98916E5-29CF-D8B7-0279-C5800AD5D653}"/>
-              </a:ext>
-            </a:extLst>
-          </p:cNvPr>
-          <p:cNvSpPr>
-            <a:spLocks noGrp="1"/>
-          </p:cNvSpPr>
-          <p:nvPr>
-            <p:ph type="sldNum" sz="quarter" idx="12"/>
+              <a:rPr lang="en-US" dirty="0"/>
+              <a:t>70-30 Split: 100%</a:t>
+            </a:r>
+          </a:p>
+        </p:txBody>
+      </p:sp>
+      <p:sp>
+        <p:nvSpPr>
+          <p:cNvPr id="6" name="Text Placeholder 5">
+            <a:extLst>
+              <a:ext uri="{FF2B5EF4-FFF2-40B4-BE49-F238E27FC236}">
+                <a16:creationId xmlns:a16="http://schemas.microsoft.com/office/drawing/2014/main" id="{A710C89A-D25F-1DF6-0BB1-BD5B0FE5512B}"/>
+              </a:ext>
+            </a:extLst>
+          </p:cNvPr>
+          <p:cNvSpPr>
+            <a:spLocks noGrp="1"/>
+          </p:cNvSpPr>
+          <p:nvPr>
+            <p:ph type="body" sz="quarter" idx="13"/>
           </p:nvPr>
         </p:nvSpPr>
         <p:spPr/>
@@ -10115,7 +10052,35 @@
           <a:bodyPr/>
           <a:lstStyle/>
           <a:p>
-            <a:fld id="{3A98EE3D-8CD1-4C3F-BD1C-C98C9596463C}" type="slidenum">
+            <a:r>
+              <a:rPr lang="en-US" dirty="0"/>
+              <a:t>80-20 Split: 100%</a:t>
+            </a:r>
+          </a:p>
+        </p:txBody>
+      </p:sp>
+      <p:sp>
+        <p:nvSpPr>
+          <p:cNvPr id="10" name="Slide Number Placeholder 9">
+            <a:extLst>
+              <a:ext uri="{FF2B5EF4-FFF2-40B4-BE49-F238E27FC236}">
+                <a16:creationId xmlns:a16="http://schemas.microsoft.com/office/drawing/2014/main" id="{6DD875C2-1E07-DA42-BB73-B42CA1B45163}"/>
+              </a:ext>
+            </a:extLst>
+          </p:cNvPr>
+          <p:cNvSpPr>
+            <a:spLocks noGrp="1"/>
+          </p:cNvSpPr>
+          <p:nvPr>
+            <p:ph type="sldNum" sz="quarter" idx="12"/>
+          </p:nvPr>
+        </p:nvSpPr>
+        <p:spPr/>
+        <p:txBody>
+          <a:bodyPr/>
+          <a:lstStyle/>
+          <a:p>
+            <a:fld id="{294A09A9-5501-47C1-A89A-A340965A2BE2}" type="slidenum">
               <a:rPr lang="en-US" smtClean="0"/>
               <a:t>19</a:t>
             </a:fld>
@@ -10125,54 +10090,47 @@
       </p:sp>
       <p:sp>
         <p:nvSpPr>
-          <p:cNvPr id="7" name="TextBox 6">
-            <a:extLst>
-              <a:ext uri="{FF2B5EF4-FFF2-40B4-BE49-F238E27FC236}">
-                <a16:creationId xmlns:a16="http://schemas.microsoft.com/office/drawing/2014/main" id="{A02DC54F-6466-9192-3FB3-3DAB4176FEA8}"/>
-              </a:ext>
-            </a:extLst>
-          </p:cNvPr>
-          <p:cNvSpPr txBox="1"/>
-          <p:nvPr/>
-        </p:nvSpPr>
-        <p:spPr>
-          <a:xfrm>
-            <a:off x="913795" y="1295904"/>
-            <a:ext cx="3733706" cy="369332"/>
-          </a:xfrm>
-          <a:prstGeom prst="rect">
-            <a:avLst/>
-          </a:prstGeom>
-          <a:noFill/>
-        </p:spPr>
-        <p:txBody>
-          <a:bodyPr wrap="square" rtlCol="0">
-            <a:spAutoFit/>
-          </a:bodyPr>
+          <p:cNvPr id="11" name="Title 10">
+            <a:extLst>
+              <a:ext uri="{FF2B5EF4-FFF2-40B4-BE49-F238E27FC236}">
+                <a16:creationId xmlns:a16="http://schemas.microsoft.com/office/drawing/2014/main" id="{E8372B2A-3790-88D1-F48A-866D8A0604F8}"/>
+              </a:ext>
+            </a:extLst>
+          </p:cNvPr>
+          <p:cNvSpPr>
+            <a:spLocks noGrp="1"/>
+          </p:cNvSpPr>
+          <p:nvPr>
+            <p:ph type="title"/>
+          </p:nvPr>
+        </p:nvSpPr>
+        <p:spPr/>
+        <p:txBody>
+          <a:bodyPr/>
           <a:lstStyle/>
           <a:p>
             <a:r>
-              <a:rPr lang="en-US" dirty="0">
-                <a:latin typeface="+mj-lt"/>
-              </a:rPr>
-              <a:t>Training Set and Testing Set</a:t>
+              <a:rPr lang="en-US" dirty="0"/>
+              <a:t>Data Training (Logistics Regression Model)</a:t>
             </a:r>
           </a:p>
         </p:txBody>
       </p:sp>
       <p:pic>
         <p:nvPicPr>
-          <p:cNvPr id="17" name="Picture 16">
-            <a:extLst>
-              <a:ext uri="{FF2B5EF4-FFF2-40B4-BE49-F238E27FC236}">
-                <a16:creationId xmlns:a16="http://schemas.microsoft.com/office/drawing/2014/main" id="{70FA2668-7A48-9EA9-1240-941E507D2D26}"/>
+          <p:cNvPr id="21" name="Content Placeholder 20">
+            <a:extLst>
+              <a:ext uri="{FF2B5EF4-FFF2-40B4-BE49-F238E27FC236}">
+                <a16:creationId xmlns:a16="http://schemas.microsoft.com/office/drawing/2014/main" id="{424146F3-8926-FC38-86A3-DC87E0B5F0E4}"/>
               </a:ext>
             </a:extLst>
           </p:cNvPr>
           <p:cNvPicPr>
-            <a:picLocks noChangeAspect="1"/>
+            <a:picLocks noGrp="1" noChangeAspect="1"/>
           </p:cNvPicPr>
-          <p:nvPr/>
+          <p:nvPr>
+            <p:ph sz="half" idx="2"/>
+          </p:nvPr>
         </p:nvPicPr>
         <p:blipFill>
           <a:blip r:embed="rId2"/>
@@ -10182,121 +10140,166 @@
         </p:blipFill>
         <p:spPr>
           <a:xfrm>
-            <a:off x="7272386" y="2917368"/>
-            <a:ext cx="3995170" cy="3083381"/>
+            <a:off x="1001713" y="2991319"/>
+            <a:ext cx="3182937" cy="2464449"/>
+          </a:xfrm>
+        </p:spPr>
+      </p:pic>
+      <p:pic>
+        <p:nvPicPr>
+          <p:cNvPr id="22" name="Content Placeholder 21">
+            <a:extLst>
+              <a:ext uri="{FF2B5EF4-FFF2-40B4-BE49-F238E27FC236}">
+                <a16:creationId xmlns:a16="http://schemas.microsoft.com/office/drawing/2014/main" id="{B1F1F94D-CA40-6547-0973-ABB04AEC45B7}"/>
+              </a:ext>
+            </a:extLst>
+          </p:cNvPr>
+          <p:cNvPicPr>
+            <a:picLocks noGrp="1" noChangeAspect="1"/>
+          </p:cNvPicPr>
+          <p:nvPr>
+            <p:ph sz="quarter" idx="14"/>
+          </p:nvPr>
+        </p:nvPicPr>
+        <p:blipFill>
+          <a:blip r:embed="rId3"/>
+          <a:stretch>
+            <a:fillRect/>
+          </a:stretch>
+        </p:blipFill>
+        <p:spPr>
+          <a:xfrm>
+            <a:off x="8035925" y="2991609"/>
+            <a:ext cx="3192463" cy="2463869"/>
           </a:xfrm>
           <a:prstGeom prst="rect">
             <a:avLst/>
           </a:prstGeom>
         </p:spPr>
       </p:pic>
-      <p:grpSp>
-        <p:nvGrpSpPr>
-          <p:cNvPr id="19" name="Group 18">
-            <a:extLst>
-              <a:ext uri="{FF2B5EF4-FFF2-40B4-BE49-F238E27FC236}">
-                <a16:creationId xmlns:a16="http://schemas.microsoft.com/office/drawing/2014/main" id="{ED3D08A8-464B-FD85-3170-2C7AC1ECD005}"/>
-              </a:ext>
-            </a:extLst>
-          </p:cNvPr>
-          <p:cNvGrpSpPr/>
+      <p:pic>
+        <p:nvPicPr>
+          <p:cNvPr id="24" name="Picture 23">
+            <a:extLst>
+              <a:ext uri="{FF2B5EF4-FFF2-40B4-BE49-F238E27FC236}">
+                <a16:creationId xmlns:a16="http://schemas.microsoft.com/office/drawing/2014/main" id="{7D0620CC-3ED0-CB00-69EC-ECA5E750C073}"/>
+              </a:ext>
+            </a:extLst>
+          </p:cNvPr>
+          <p:cNvPicPr>
+            <a:picLocks noChangeAspect="1"/>
+          </p:cNvPicPr>
           <p:nvPr/>
-        </p:nvGrpSpPr>
-        <p:grpSpPr>
-          <a:xfrm>
-            <a:off x="661801" y="3758268"/>
-            <a:ext cx="6199684" cy="553673"/>
-            <a:chOff x="661801" y="3758268"/>
-            <a:chExt cx="6199684" cy="553673"/>
-          </a:xfrm>
-        </p:grpSpPr>
-        <p:pic>
-          <p:nvPicPr>
-            <p:cNvPr id="11" name="Picture 10">
-              <a:extLst>
-                <a:ext uri="{FF2B5EF4-FFF2-40B4-BE49-F238E27FC236}">
-                  <a16:creationId xmlns:a16="http://schemas.microsoft.com/office/drawing/2014/main" id="{57808A97-3146-4D34-D2BB-DAAB4B008D8D}"/>
-                </a:ext>
-              </a:extLst>
-            </p:cNvPr>
-            <p:cNvPicPr>
-              <a:picLocks noChangeAspect="1"/>
-            </p:cNvPicPr>
-            <p:nvPr/>
-          </p:nvPicPr>
-          <p:blipFill>
-            <a:blip r:embed="rId3"/>
-            <a:stretch>
-              <a:fillRect/>
-            </a:stretch>
-          </p:blipFill>
-          <p:spPr>
-            <a:xfrm>
-              <a:off x="661801" y="3844157"/>
-              <a:ext cx="6199684" cy="400267"/>
-            </a:xfrm>
-            <a:prstGeom prst="rect">
-              <a:avLst/>
-            </a:prstGeom>
-          </p:spPr>
-        </p:pic>
-        <p:sp>
-          <p:nvSpPr>
-            <p:cNvPr id="18" name="Oval 17">
-              <a:extLst>
-                <a:ext uri="{FF2B5EF4-FFF2-40B4-BE49-F238E27FC236}">
-                  <a16:creationId xmlns:a16="http://schemas.microsoft.com/office/drawing/2014/main" id="{CDFBBF9D-55B8-F3FA-F1FB-AF56C9E4C5CD}"/>
-                </a:ext>
-              </a:extLst>
-            </p:cNvPr>
-            <p:cNvSpPr/>
-            <p:nvPr/>
-          </p:nvSpPr>
-          <p:spPr>
-            <a:xfrm>
-              <a:off x="5654180" y="3758268"/>
-              <a:ext cx="1124125" cy="553673"/>
-            </a:xfrm>
-            <a:prstGeom prst="ellipse">
-              <a:avLst/>
-            </a:prstGeom>
-            <a:noFill/>
-            <a:ln>
-              <a:solidFill>
-                <a:srgbClr val="FF0000"/>
-              </a:solidFill>
-            </a:ln>
-          </p:spPr>
-          <p:style>
-            <a:lnRef idx="2">
-              <a:schemeClr val="accent1">
-                <a:shade val="50000"/>
-              </a:schemeClr>
-            </a:lnRef>
-            <a:fillRef idx="1">
-              <a:schemeClr val="accent1"/>
-            </a:fillRef>
-            <a:effectRef idx="0">
-              <a:schemeClr val="accent1"/>
-            </a:effectRef>
-            <a:fontRef idx="minor">
-              <a:schemeClr val="lt1"/>
-            </a:fontRef>
-          </p:style>
-          <p:txBody>
-            <a:bodyPr rtlCol="0" anchor="ctr"/>
-            <a:lstStyle/>
-            <a:p>
-              <a:pPr algn="ctr"/>
-              <a:endParaRPr lang="en-US"/>
-            </a:p>
-          </p:txBody>
-        </p:sp>
-      </p:grpSp>
+        </p:nvPicPr>
+        <p:blipFill>
+          <a:blip r:embed="rId4"/>
+          <a:stretch>
+            <a:fillRect/>
+          </a:stretch>
+        </p:blipFill>
+        <p:spPr>
+          <a:xfrm>
+            <a:off x="8050124" y="5484053"/>
+            <a:ext cx="3182938" cy="806853"/>
+          </a:xfrm>
+          <a:prstGeom prst="rect">
+            <a:avLst/>
+          </a:prstGeom>
+        </p:spPr>
+      </p:pic>
+      <p:pic>
+        <p:nvPicPr>
+          <p:cNvPr id="26" name="Picture 25">
+            <a:extLst>
+              <a:ext uri="{FF2B5EF4-FFF2-40B4-BE49-F238E27FC236}">
+                <a16:creationId xmlns:a16="http://schemas.microsoft.com/office/drawing/2014/main" id="{B16A6DE9-DFE9-A3AE-D124-90784CB7614F}"/>
+              </a:ext>
+            </a:extLst>
+          </p:cNvPr>
+          <p:cNvPicPr>
+            <a:picLocks noChangeAspect="1"/>
+          </p:cNvPicPr>
+          <p:nvPr/>
+        </p:nvPicPr>
+        <p:blipFill>
+          <a:blip r:embed="rId5"/>
+          <a:stretch>
+            <a:fillRect/>
+          </a:stretch>
+        </p:blipFill>
+        <p:spPr>
+          <a:xfrm>
+            <a:off x="4498975" y="5484053"/>
+            <a:ext cx="3193447" cy="872219"/>
+          </a:xfrm>
+          <a:prstGeom prst="rect">
+            <a:avLst/>
+          </a:prstGeom>
+        </p:spPr>
+      </p:pic>
+      <p:pic>
+        <p:nvPicPr>
+          <p:cNvPr id="28" name="Picture 27">
+            <a:extLst>
+              <a:ext uri="{FF2B5EF4-FFF2-40B4-BE49-F238E27FC236}">
+                <a16:creationId xmlns:a16="http://schemas.microsoft.com/office/drawing/2014/main" id="{52432E85-356B-1F3A-A52E-3AC93CBC56F6}"/>
+              </a:ext>
+            </a:extLst>
+          </p:cNvPr>
+          <p:cNvPicPr>
+            <a:picLocks noChangeAspect="1"/>
+          </p:cNvPicPr>
+          <p:nvPr/>
+        </p:nvPicPr>
+        <p:blipFill>
+          <a:blip r:embed="rId6"/>
+          <a:stretch>
+            <a:fillRect/>
+          </a:stretch>
+        </p:blipFill>
+        <p:spPr>
+          <a:xfrm>
+            <a:off x="1001624" y="5484812"/>
+            <a:ext cx="3182938" cy="991973"/>
+          </a:xfrm>
+          <a:prstGeom prst="rect">
+            <a:avLst/>
+          </a:prstGeom>
+        </p:spPr>
+      </p:pic>
+      <p:pic>
+        <p:nvPicPr>
+          <p:cNvPr id="32" name="Content Placeholder 31">
+            <a:extLst>
+              <a:ext uri="{FF2B5EF4-FFF2-40B4-BE49-F238E27FC236}">
+                <a16:creationId xmlns:a16="http://schemas.microsoft.com/office/drawing/2014/main" id="{D701AFA8-F017-C561-C9D7-4518997835B4}"/>
+              </a:ext>
+            </a:extLst>
+          </p:cNvPr>
+          <p:cNvPicPr>
+            <a:picLocks noGrp="1" noChangeAspect="1"/>
+          </p:cNvPicPr>
+          <p:nvPr>
+            <p:ph sz="quarter" idx="4"/>
+          </p:nvPr>
+        </p:nvPicPr>
+        <p:blipFill>
+          <a:blip r:embed="rId7"/>
+          <a:stretch>
+            <a:fillRect/>
+          </a:stretch>
+        </p:blipFill>
+        <p:spPr>
+          <a:xfrm>
+            <a:off x="4498975" y="3000411"/>
+            <a:ext cx="3194050" cy="2446266"/>
+          </a:xfrm>
+        </p:spPr>
+      </p:pic>
     </p:spTree>
     <p:extLst>
       <p:ext uri="{BB962C8B-B14F-4D97-AF65-F5344CB8AC3E}">
-        <p14:creationId xmlns:p14="http://schemas.microsoft.com/office/powerpoint/2010/main" val="2055621839"/>
+        <p14:creationId xmlns:p14="http://schemas.microsoft.com/office/powerpoint/2010/main" val="3376227943"/>
       </p:ext>
     </p:extLst>
   </p:cSld>
@@ -10593,13 +10596,7 @@
       </p:grpSpPr>
       <p:sp>
         <p:nvSpPr>
-          <p:cNvPr id="2" name="Title 1">
-            <a:extLst>
-              <a:ext uri="{FF2B5EF4-FFF2-40B4-BE49-F238E27FC236}">
-                <a16:creationId xmlns:a16="http://schemas.microsoft.com/office/drawing/2014/main" id="{2A3E433D-2AB8-5E83-A18C-0F85BA06AB7D}"/>
-              </a:ext>
-            </a:extLst>
-          </p:cNvPr>
+          <p:cNvPr id="2" name="Title 1"/>
           <p:cNvSpPr>
             <a:spLocks noGrp="1"/>
           </p:cNvSpPr>
@@ -10609,191 +10606,95 @@
         </p:nvSpPr>
         <p:spPr>
           <a:xfrm>
-            <a:off x="913795" y="609600"/>
-            <a:ext cx="10353762" cy="741028"/>
-          </a:xfrm>
-        </p:spPr>
-        <p:txBody>
-          <a:bodyPr/>
-          <a:lstStyle/>
-          <a:p>
-            <a:pPr algn="l"/>
-            <a:r>
-              <a:rPr lang="en-US" dirty="0"/>
-              <a:t>Data Training</a:t>
-            </a:r>
-          </a:p>
-        </p:txBody>
-      </p:sp>
-      <p:sp>
-        <p:nvSpPr>
-          <p:cNvPr id="3" name="Content Placeholder 2">
-            <a:extLst>
-              <a:ext uri="{FF2B5EF4-FFF2-40B4-BE49-F238E27FC236}">
-                <a16:creationId xmlns:a16="http://schemas.microsoft.com/office/drawing/2014/main" id="{555F7494-3A77-26D8-14AB-35DD7B0E00E2}"/>
-              </a:ext>
-            </a:extLst>
-          </p:cNvPr>
-          <p:cNvSpPr>
-            <a:spLocks noGrp="1"/>
-          </p:cNvSpPr>
-          <p:nvPr>
-            <p:ph idx="1"/>
-          </p:nvPr>
-        </p:nvSpPr>
-        <p:spPr>
-          <a:xfrm>
-            <a:off x="913795" y="1812022"/>
-            <a:ext cx="10353762" cy="3979177"/>
-          </a:xfrm>
-        </p:spPr>
-        <p:txBody>
-          <a:bodyPr/>
-          <a:lstStyle/>
-          <a:p>
-            <a:r>
-              <a:rPr lang="en-US" dirty="0">
-                <a:effectLst>
-                  <a:outerShdw blurRad="38100" dist="38100" dir="2700000" algn="tl">
-                    <a:srgbClr val="000000">
-                      <a:alpha val="43137"/>
-                    </a:srgbClr>
-                  </a:outerShdw>
-                </a:effectLst>
-              </a:rPr>
-              <a:t>Predicting direction of stock price: “UP/INCREASE” (1) or “DOWN/DECREASE” (-1)</a:t>
-            </a:r>
-          </a:p>
-          <a:p>
-            <a:pPr lvl="1"/>
-            <a:r>
-              <a:rPr lang="en-US" dirty="0">
-                <a:effectLst>
-                  <a:outerShdw blurRad="38100" dist="38100" dir="2700000" algn="tl">
-                    <a:srgbClr val="000000">
-                      <a:alpha val="43137"/>
-                    </a:srgbClr>
-                  </a:outerShdw>
-                </a:effectLst>
-              </a:rPr>
-              <a:t>The resulting prediction is a binary outcome (one or the other)</a:t>
-            </a:r>
-          </a:p>
-          <a:p>
-            <a:pPr marL="450000" lvl="1" indent="0">
-              <a:buNone/>
-            </a:pPr>
-            <a:endParaRPr lang="en-US" dirty="0">
-              <a:effectLst>
-                <a:outerShdw blurRad="38100" dist="38100" dir="2700000" algn="tl">
-                  <a:srgbClr val="000000">
-                    <a:alpha val="43137"/>
-                  </a:srgbClr>
-                </a:outerShdw>
-              </a:effectLst>
-            </a:endParaRPr>
-          </a:p>
-          <a:p>
-            <a:r>
-              <a:rPr lang="en-US" dirty="0">
-                <a:effectLst>
-                  <a:outerShdw blurRad="38100" dist="38100" dir="2700000" algn="tl">
-                    <a:srgbClr val="000000">
-                      <a:alpha val="43137"/>
-                    </a:srgbClr>
-                  </a:outerShdw>
-                </a:effectLst>
-              </a:rPr>
-              <a:t>Logistic Regression Model chosen</a:t>
-            </a:r>
-          </a:p>
-          <a:p>
-            <a:pPr lvl="1"/>
-            <a:r>
-              <a:rPr lang="en-US" dirty="0">
-                <a:effectLst>
-                  <a:outerShdw blurRad="38100" dist="38100" dir="2700000" algn="tl">
-                    <a:srgbClr val="000000">
-                      <a:alpha val="43137"/>
-                    </a:srgbClr>
-                  </a:outerShdw>
-                </a:effectLst>
-              </a:rPr>
-              <a:t>A model to predict a binary outcome</a:t>
-            </a:r>
-          </a:p>
-        </p:txBody>
-      </p:sp>
-      <p:sp>
-        <p:nvSpPr>
-          <p:cNvPr id="6" name="Slide Number Placeholder 5">
-            <a:extLst>
-              <a:ext uri="{FF2B5EF4-FFF2-40B4-BE49-F238E27FC236}">
-                <a16:creationId xmlns:a16="http://schemas.microsoft.com/office/drawing/2014/main" id="{A98916E5-29CF-D8B7-0279-C5800AD5D653}"/>
-              </a:ext>
-            </a:extLst>
-          </p:cNvPr>
-          <p:cNvSpPr>
-            <a:spLocks noGrp="1"/>
-          </p:cNvSpPr>
-          <p:nvPr>
-            <p:ph type="sldNum" sz="quarter" idx="12"/>
-          </p:nvPr>
-        </p:nvSpPr>
-        <p:spPr/>
-        <p:txBody>
-          <a:bodyPr/>
-          <a:lstStyle/>
-          <a:p>
-            <a:fld id="{3A98EE3D-8CD1-4C3F-BD1C-C98C9596463C}" type="slidenum">
-              <a:rPr lang="en-US" smtClean="0"/>
-              <a:t>20</a:t>
-            </a:fld>
-            <a:endParaRPr lang="en-US" dirty="0"/>
-          </a:p>
-        </p:txBody>
-      </p:sp>
-      <p:sp>
-        <p:nvSpPr>
-          <p:cNvPr id="7" name="TextBox 6">
-            <a:extLst>
-              <a:ext uri="{FF2B5EF4-FFF2-40B4-BE49-F238E27FC236}">
-                <a16:creationId xmlns:a16="http://schemas.microsoft.com/office/drawing/2014/main" id="{A02DC54F-6466-9192-3FB3-3DAB4176FEA8}"/>
-              </a:ext>
-            </a:extLst>
-          </p:cNvPr>
-          <p:cNvSpPr txBox="1"/>
-          <p:nvPr/>
-        </p:nvSpPr>
-        <p:spPr>
-          <a:xfrm>
-            <a:off x="913795" y="1295904"/>
-            <a:ext cx="3733706" cy="369332"/>
-          </a:xfrm>
-          <a:prstGeom prst="rect">
-            <a:avLst/>
-          </a:prstGeom>
-          <a:noFill/>
-        </p:spPr>
-        <p:txBody>
-          <a:bodyPr wrap="square" rtlCol="0">
-            <a:spAutoFit/>
+            <a:off x="1370693" y="4913529"/>
+            <a:ext cx="9440034" cy="680691"/>
+          </a:xfrm>
+        </p:spPr>
+        <p:txBody>
+          <a:bodyPr>
+            <a:normAutofit fontScale="90000"/>
           </a:bodyPr>
           <a:lstStyle/>
           <a:p>
             <a:r>
-              <a:rPr lang="en-US" dirty="0">
-                <a:latin typeface="+mj-lt"/>
-              </a:rPr>
-              <a:t>Training Model</a:t>
-            </a:r>
-          </a:p>
-        </p:txBody>
-      </p:sp>
+              <a:rPr lang="en-US" dirty="0"/>
+              <a:t>Data Testing</a:t>
+            </a:r>
+          </a:p>
+        </p:txBody>
+      </p:sp>
+      <p:pic>
+        <p:nvPicPr>
+          <p:cNvPr id="19" name="Picture Placeholder 18" descr="A person pouring a drink into a glass">
+            <a:extLst>
+              <a:ext uri="{FF2B5EF4-FFF2-40B4-BE49-F238E27FC236}">
+                <a16:creationId xmlns:a16="http://schemas.microsoft.com/office/drawing/2014/main" id="{D338679F-6846-44CF-9649-6E526940900A}"/>
+              </a:ext>
+            </a:extLst>
+          </p:cNvPr>
+          <p:cNvPicPr>
+            <a:picLocks noGrp="1" noChangeAspect="1"/>
+          </p:cNvPicPr>
+          <p:nvPr>
+            <p:ph type="pic" sz="quarter" idx="13"/>
+          </p:nvPr>
+        </p:nvPicPr>
+        <p:blipFill rotWithShape="1">
+          <a:blip r:embed="rId3" cstate="screen">
+            <a:extLst>
+              <a:ext uri="{28A0092B-C50C-407E-A947-70E740481C1C}">
+                <a14:useLocalDpi xmlns:a14="http://schemas.microsoft.com/office/drawing/2010/main" val="0"/>
+              </a:ext>
+            </a:extLst>
+          </a:blip>
+          <a:srcRect/>
+          <a:stretch/>
+        </p:blipFill>
+        <p:spPr>
+          <a:xfrm>
+            <a:off x="642938" y="642938"/>
+            <a:ext cx="5130800" cy="3303587"/>
+          </a:xfrm>
+        </p:spPr>
+      </p:pic>
+      <p:pic>
+        <p:nvPicPr>
+          <p:cNvPr id="21" name="Picture Placeholder 20" descr="A person holding an open sign in a window">
+            <a:extLst>
+              <a:ext uri="{FF2B5EF4-FFF2-40B4-BE49-F238E27FC236}">
+                <a16:creationId xmlns:a16="http://schemas.microsoft.com/office/drawing/2014/main" id="{FF9E2F27-0A96-4978-B761-6D73AA56EC01}"/>
+              </a:ext>
+            </a:extLst>
+          </p:cNvPr>
+          <p:cNvPicPr>
+            <a:picLocks noGrp="1" noChangeAspect="1"/>
+          </p:cNvPicPr>
+          <p:nvPr>
+            <p:ph type="pic" sz="quarter" idx="14"/>
+          </p:nvPr>
+        </p:nvPicPr>
+        <p:blipFill rotWithShape="1">
+          <a:blip r:embed="rId4" cstate="screen">
+            <a:extLst>
+              <a:ext uri="{28A0092B-C50C-407E-A947-70E740481C1C}">
+                <a14:useLocalDpi xmlns:a14="http://schemas.microsoft.com/office/drawing/2010/main" val="0"/>
+              </a:ext>
+            </a:extLst>
+          </a:blip>
+          <a:srcRect/>
+          <a:stretch/>
+        </p:blipFill>
+        <p:spPr>
+          <a:xfrm>
+            <a:off x="6417733" y="642937"/>
+            <a:ext cx="5130800" cy="3303587"/>
+          </a:xfrm>
+        </p:spPr>
+      </p:pic>
     </p:spTree>
     <p:extLst>
       <p:ext uri="{BB962C8B-B14F-4D97-AF65-F5344CB8AC3E}">
-        <p14:creationId xmlns:p14="http://schemas.microsoft.com/office/powerpoint/2010/main" val="4004273679"/>
+        <p14:creationId xmlns:p14="http://schemas.microsoft.com/office/powerpoint/2010/main" val="354153869"/>
       </p:ext>
     </p:extLst>
   </p:cSld>
@@ -10822,7 +10723,126 @@
       </p:grpSpPr>
       <p:sp>
         <p:nvSpPr>
-          <p:cNvPr id="2" name="Title 1"/>
+          <p:cNvPr id="2" name="Text Placeholder 1">
+            <a:extLst>
+              <a:ext uri="{FF2B5EF4-FFF2-40B4-BE49-F238E27FC236}">
+                <a16:creationId xmlns:a16="http://schemas.microsoft.com/office/drawing/2014/main" id="{788D719C-8247-80E8-3AAC-9DFBCCFBC6B0}"/>
+              </a:ext>
+            </a:extLst>
+          </p:cNvPr>
+          <p:cNvSpPr>
+            <a:spLocks noGrp="1"/>
+          </p:cNvSpPr>
+          <p:nvPr>
+            <p:ph type="body" idx="1"/>
+          </p:nvPr>
+        </p:nvSpPr>
+        <p:spPr/>
+        <p:txBody>
+          <a:bodyPr/>
+          <a:lstStyle/>
+          <a:p>
+            <a:r>
+              <a:rPr lang="en-US" dirty="0"/>
+              <a:t>50-50 Split: 80%</a:t>
+            </a:r>
+          </a:p>
+        </p:txBody>
+      </p:sp>
+      <p:sp>
+        <p:nvSpPr>
+          <p:cNvPr id="4" name="Text Placeholder 3">
+            <a:extLst>
+              <a:ext uri="{FF2B5EF4-FFF2-40B4-BE49-F238E27FC236}">
+                <a16:creationId xmlns:a16="http://schemas.microsoft.com/office/drawing/2014/main" id="{6F206336-545C-FA93-25A4-C5E6E0F96CAB}"/>
+              </a:ext>
+            </a:extLst>
+          </p:cNvPr>
+          <p:cNvSpPr>
+            <a:spLocks noGrp="1"/>
+          </p:cNvSpPr>
+          <p:nvPr>
+            <p:ph type="body" sz="quarter" idx="3"/>
+          </p:nvPr>
+        </p:nvSpPr>
+        <p:spPr/>
+        <p:txBody>
+          <a:bodyPr/>
+          <a:lstStyle/>
+          <a:p>
+            <a:r>
+              <a:rPr lang="en-US" dirty="0"/>
+              <a:t>70-30 Split: 67%</a:t>
+            </a:r>
+          </a:p>
+        </p:txBody>
+      </p:sp>
+      <p:sp>
+        <p:nvSpPr>
+          <p:cNvPr id="6" name="Text Placeholder 5">
+            <a:extLst>
+              <a:ext uri="{FF2B5EF4-FFF2-40B4-BE49-F238E27FC236}">
+                <a16:creationId xmlns:a16="http://schemas.microsoft.com/office/drawing/2014/main" id="{A710C89A-D25F-1DF6-0BB1-BD5B0FE5512B}"/>
+              </a:ext>
+            </a:extLst>
+          </p:cNvPr>
+          <p:cNvSpPr>
+            <a:spLocks noGrp="1"/>
+          </p:cNvSpPr>
+          <p:nvPr>
+            <p:ph type="body" sz="quarter" idx="13"/>
+          </p:nvPr>
+        </p:nvSpPr>
+        <p:spPr/>
+        <p:txBody>
+          <a:bodyPr/>
+          <a:lstStyle/>
+          <a:p>
+            <a:r>
+              <a:rPr lang="en-US" dirty="0"/>
+              <a:t>80-20 Split: 50%</a:t>
+            </a:r>
+          </a:p>
+        </p:txBody>
+      </p:sp>
+      <p:sp>
+        <p:nvSpPr>
+          <p:cNvPr id="10" name="Slide Number Placeholder 9">
+            <a:extLst>
+              <a:ext uri="{FF2B5EF4-FFF2-40B4-BE49-F238E27FC236}">
+                <a16:creationId xmlns:a16="http://schemas.microsoft.com/office/drawing/2014/main" id="{6DD875C2-1E07-DA42-BB73-B42CA1B45163}"/>
+              </a:ext>
+            </a:extLst>
+          </p:cNvPr>
+          <p:cNvSpPr>
+            <a:spLocks noGrp="1"/>
+          </p:cNvSpPr>
+          <p:nvPr>
+            <p:ph type="sldNum" sz="quarter" idx="12"/>
+          </p:nvPr>
+        </p:nvSpPr>
+        <p:spPr/>
+        <p:txBody>
+          <a:bodyPr/>
+          <a:lstStyle/>
+          <a:p>
+            <a:fld id="{294A09A9-5501-47C1-A89A-A340965A2BE2}" type="slidenum">
+              <a:rPr lang="en-US" smtClean="0"/>
+              <a:t>21</a:t>
+            </a:fld>
+            <a:endParaRPr lang="en-US" dirty="0"/>
+          </a:p>
+        </p:txBody>
+      </p:sp>
+      <p:sp>
+        <p:nvSpPr>
+          <p:cNvPr id="11" name="Title 10">
+            <a:extLst>
+              <a:ext uri="{FF2B5EF4-FFF2-40B4-BE49-F238E27FC236}">
+                <a16:creationId xmlns:a16="http://schemas.microsoft.com/office/drawing/2014/main" id="{E8372B2A-3790-88D1-F48A-866D8A0604F8}"/>
+              </a:ext>
+            </a:extLst>
+          </p:cNvPr>
           <p:cNvSpPr>
             <a:spLocks noGrp="1"/>
           </p:cNvSpPr>
@@ -10830,31 +10850,24 @@
             <p:ph type="title"/>
           </p:nvPr>
         </p:nvSpPr>
-        <p:spPr>
-          <a:xfrm>
-            <a:off x="1370693" y="4913529"/>
-            <a:ext cx="9440034" cy="680691"/>
-          </a:xfrm>
-        </p:spPr>
-        <p:txBody>
-          <a:bodyPr>
-            <a:normAutofit fontScale="90000"/>
-          </a:bodyPr>
+        <p:spPr/>
+        <p:txBody>
+          <a:bodyPr/>
           <a:lstStyle/>
           <a:p>
             <a:r>
               <a:rPr lang="en-US" dirty="0"/>
-              <a:t>Data Testing</a:t>
+              <a:t>Data Training (Logistics Regression Model)</a:t>
             </a:r>
           </a:p>
         </p:txBody>
       </p:sp>
       <p:pic>
         <p:nvPicPr>
-          <p:cNvPr id="19" name="Picture Placeholder 18" descr="A person pouring a drink into a glass">
-            <a:extLst>
-              <a:ext uri="{FF2B5EF4-FFF2-40B4-BE49-F238E27FC236}">
-                <a16:creationId xmlns:a16="http://schemas.microsoft.com/office/drawing/2014/main" id="{D338679F-6846-44CF-9649-6E526940900A}"/>
+          <p:cNvPr id="16" name="Content Placeholder 15">
+            <a:extLst>
+              <a:ext uri="{FF2B5EF4-FFF2-40B4-BE49-F238E27FC236}">
+                <a16:creationId xmlns:a16="http://schemas.microsoft.com/office/drawing/2014/main" id="{BB624C12-CA8D-243D-A0F1-925739D648EE}"/>
               </a:ext>
             </a:extLst>
           </p:cNvPr>
@@ -10862,65 +10875,226 @@
             <a:picLocks noGrp="1" noChangeAspect="1"/>
           </p:cNvPicPr>
           <p:nvPr>
-            <p:ph type="pic" sz="quarter" idx="13"/>
+            <p:ph sz="half" idx="2"/>
           </p:nvPr>
         </p:nvPicPr>
-        <p:blipFill rotWithShape="1">
-          <a:blip r:embed="rId3" cstate="screen">
-            <a:extLst>
-              <a:ext uri="{28A0092B-C50C-407E-A947-70E740481C1C}">
-                <a14:useLocalDpi xmlns:a14="http://schemas.microsoft.com/office/drawing/2010/main" val="0"/>
-              </a:ext>
-            </a:extLst>
-          </a:blip>
-          <a:srcRect/>
-          <a:stretch/>
+        <p:blipFill>
+          <a:blip r:embed="rId2"/>
+          <a:stretch>
+            <a:fillRect/>
+          </a:stretch>
         </p:blipFill>
         <p:spPr>
           <a:xfrm>
-            <a:off x="642938" y="642938"/>
-            <a:ext cx="5130800" cy="3303587"/>
-          </a:xfrm>
+            <a:off x="1737035" y="2702103"/>
+            <a:ext cx="1712119" cy="2543365"/>
+          </a:xfrm>
+        </p:spPr>
+      </p:pic>
+      <p:sp>
+        <p:nvSpPr>
+          <p:cNvPr id="8" name="Content Placeholder 7">
+            <a:extLst>
+              <a:ext uri="{FF2B5EF4-FFF2-40B4-BE49-F238E27FC236}">
+                <a16:creationId xmlns:a16="http://schemas.microsoft.com/office/drawing/2014/main" id="{EDF1ED29-E339-D7EB-EB55-F3789EFC7ED2}"/>
+              </a:ext>
+            </a:extLst>
+          </p:cNvPr>
+          <p:cNvSpPr>
+            <a:spLocks noGrp="1"/>
+          </p:cNvSpPr>
+          <p:nvPr>
+            <p:ph sz="quarter" idx="4"/>
+          </p:nvPr>
+        </p:nvSpPr>
+        <p:spPr/>
+        <p:txBody>
+          <a:bodyPr/>
+          <a:lstStyle/>
+          <a:p>
+            <a:endParaRPr lang="en-US" dirty="0"/>
+          </a:p>
+        </p:txBody>
+      </p:sp>
+      <p:sp>
+        <p:nvSpPr>
+          <p:cNvPr id="12" name="Content Placeholder 11">
+            <a:extLst>
+              <a:ext uri="{FF2B5EF4-FFF2-40B4-BE49-F238E27FC236}">
+                <a16:creationId xmlns:a16="http://schemas.microsoft.com/office/drawing/2014/main" id="{B290B0E3-0B4E-94A0-E8FD-7F7DC2E57DB3}"/>
+              </a:ext>
+            </a:extLst>
+          </p:cNvPr>
+          <p:cNvSpPr>
+            <a:spLocks noGrp="1"/>
+          </p:cNvSpPr>
+          <p:nvPr>
+            <p:ph sz="quarter" idx="14"/>
+          </p:nvPr>
+        </p:nvSpPr>
+        <p:spPr/>
+        <p:txBody>
+          <a:bodyPr/>
+          <a:lstStyle/>
+          <a:p>
+            <a:endParaRPr lang="en-US" dirty="0"/>
+          </a:p>
+        </p:txBody>
+      </p:sp>
+      <p:pic>
+        <p:nvPicPr>
+          <p:cNvPr id="18" name="Picture 17">
+            <a:extLst>
+              <a:ext uri="{FF2B5EF4-FFF2-40B4-BE49-F238E27FC236}">
+                <a16:creationId xmlns:a16="http://schemas.microsoft.com/office/drawing/2014/main" id="{FE388B68-2333-F31F-FA88-35BF4F9A1B42}"/>
+              </a:ext>
+            </a:extLst>
+          </p:cNvPr>
+          <p:cNvPicPr>
+            <a:picLocks noChangeAspect="1"/>
+          </p:cNvPicPr>
+          <p:nvPr/>
+        </p:nvPicPr>
+        <p:blipFill>
+          <a:blip r:embed="rId3"/>
+          <a:stretch>
+            <a:fillRect/>
+          </a:stretch>
+        </p:blipFill>
+        <p:spPr>
+          <a:xfrm>
+            <a:off x="1354844" y="5342774"/>
+            <a:ext cx="2476500" cy="457200"/>
+          </a:xfrm>
+          <a:prstGeom prst="rect">
+            <a:avLst/>
+          </a:prstGeom>
         </p:spPr>
       </p:pic>
       <p:pic>
         <p:nvPicPr>
-          <p:cNvPr id="21" name="Picture Placeholder 20" descr="A person holding an open sign in a window">
-            <a:extLst>
-              <a:ext uri="{FF2B5EF4-FFF2-40B4-BE49-F238E27FC236}">
-                <a16:creationId xmlns:a16="http://schemas.microsoft.com/office/drawing/2014/main" id="{FF9E2F27-0A96-4978-B761-6D73AA56EC01}"/>
+          <p:cNvPr id="29" name="Picture 28">
+            <a:extLst>
+              <a:ext uri="{FF2B5EF4-FFF2-40B4-BE49-F238E27FC236}">
+                <a16:creationId xmlns:a16="http://schemas.microsoft.com/office/drawing/2014/main" id="{A7F6384B-117C-4BB7-FF79-7D00CA014933}"/>
               </a:ext>
             </a:extLst>
           </p:cNvPr>
           <p:cNvPicPr>
-            <a:picLocks noGrp="1" noChangeAspect="1"/>
+            <a:picLocks noChangeAspect="1"/>
           </p:cNvPicPr>
-          <p:nvPr>
-            <p:ph type="pic" sz="quarter" idx="14"/>
-          </p:nvPr>
+          <p:nvPr/>
         </p:nvPicPr>
-        <p:blipFill rotWithShape="1">
-          <a:blip r:embed="rId4" cstate="screen">
-            <a:extLst>
-              <a:ext uri="{28A0092B-C50C-407E-A947-70E740481C1C}">
-                <a14:useLocalDpi xmlns:a14="http://schemas.microsoft.com/office/drawing/2010/main" val="0"/>
-              </a:ext>
-            </a:extLst>
-          </a:blip>
-          <a:srcRect/>
-          <a:stretch/>
+        <p:blipFill>
+          <a:blip r:embed="rId4"/>
+          <a:stretch>
+            <a:fillRect/>
+          </a:stretch>
         </p:blipFill>
         <p:spPr>
           <a:xfrm>
-            <a:off x="6417733" y="642937"/>
-            <a:ext cx="5130800" cy="3303587"/>
-          </a:xfrm>
+            <a:off x="5199604" y="3433294"/>
+            <a:ext cx="1782144" cy="1581150"/>
+          </a:xfrm>
+          <a:prstGeom prst="rect">
+            <a:avLst/>
+          </a:prstGeom>
+        </p:spPr>
+      </p:pic>
+      <p:pic>
+        <p:nvPicPr>
+          <p:cNvPr id="31" name="Picture 30">
+            <a:extLst>
+              <a:ext uri="{FF2B5EF4-FFF2-40B4-BE49-F238E27FC236}">
+                <a16:creationId xmlns:a16="http://schemas.microsoft.com/office/drawing/2014/main" id="{C6E6C58A-D5DC-A0BA-CEA3-674C72500C3C}"/>
+              </a:ext>
+            </a:extLst>
+          </p:cNvPr>
+          <p:cNvPicPr>
+            <a:picLocks noChangeAspect="1"/>
+          </p:cNvPicPr>
+          <p:nvPr/>
+        </p:nvPicPr>
+        <p:blipFill>
+          <a:blip r:embed="rId5"/>
+          <a:stretch>
+            <a:fillRect/>
+          </a:stretch>
+        </p:blipFill>
+        <p:spPr>
+          <a:xfrm>
+            <a:off x="5199604" y="5168900"/>
+            <a:ext cx="1790700" cy="438150"/>
+          </a:xfrm>
+          <a:prstGeom prst="rect">
+            <a:avLst/>
+          </a:prstGeom>
+        </p:spPr>
+      </p:pic>
+      <p:pic>
+        <p:nvPicPr>
+          <p:cNvPr id="33" name="Picture 32">
+            <a:extLst>
+              <a:ext uri="{FF2B5EF4-FFF2-40B4-BE49-F238E27FC236}">
+                <a16:creationId xmlns:a16="http://schemas.microsoft.com/office/drawing/2014/main" id="{F39638FC-DABF-02BD-CE93-F50D980C9771}"/>
+              </a:ext>
+            </a:extLst>
+          </p:cNvPr>
+          <p:cNvPicPr>
+            <a:picLocks noChangeAspect="1"/>
+          </p:cNvPicPr>
+          <p:nvPr/>
+        </p:nvPicPr>
+        <p:blipFill>
+          <a:blip r:embed="rId6"/>
+          <a:stretch>
+            <a:fillRect/>
+          </a:stretch>
+        </p:blipFill>
+        <p:spPr>
+          <a:xfrm>
+            <a:off x="8561871" y="3421724"/>
+            <a:ext cx="2147937" cy="1285380"/>
+          </a:xfrm>
+          <a:prstGeom prst="rect">
+            <a:avLst/>
+          </a:prstGeom>
+        </p:spPr>
+      </p:pic>
+      <p:pic>
+        <p:nvPicPr>
+          <p:cNvPr id="37" name="Picture 36">
+            <a:extLst>
+              <a:ext uri="{FF2B5EF4-FFF2-40B4-BE49-F238E27FC236}">
+                <a16:creationId xmlns:a16="http://schemas.microsoft.com/office/drawing/2014/main" id="{B8A15E05-DB21-5907-8D5A-C459986EA8B0}"/>
+              </a:ext>
+            </a:extLst>
+          </p:cNvPr>
+          <p:cNvPicPr>
+            <a:picLocks noChangeAspect="1"/>
+          </p:cNvPicPr>
+          <p:nvPr/>
+        </p:nvPicPr>
+        <p:blipFill>
+          <a:blip r:embed="rId7"/>
+          <a:stretch>
+            <a:fillRect/>
+          </a:stretch>
+        </p:blipFill>
+        <p:spPr>
+          <a:xfrm>
+            <a:off x="8561871" y="4861560"/>
+            <a:ext cx="2177718" cy="591301"/>
+          </a:xfrm>
+          <a:prstGeom prst="rect">
+            <a:avLst/>
+          </a:prstGeom>
         </p:spPr>
       </p:pic>
     </p:spTree>
     <p:extLst>
       <p:ext uri="{BB962C8B-B14F-4D97-AF65-F5344CB8AC3E}">
-        <p14:creationId xmlns:p14="http://schemas.microsoft.com/office/powerpoint/2010/main" val="354153869"/>
+        <p14:creationId xmlns:p14="http://schemas.microsoft.com/office/powerpoint/2010/main" val="492605747"/>
       </p:ext>
     </p:extLst>
   </p:cSld>
@@ -10949,13 +11123,7 @@
       </p:grpSpPr>
       <p:sp>
         <p:nvSpPr>
-          <p:cNvPr id="2" name="Title 1">
-            <a:extLst>
-              <a:ext uri="{FF2B5EF4-FFF2-40B4-BE49-F238E27FC236}">
-                <a16:creationId xmlns:a16="http://schemas.microsoft.com/office/drawing/2014/main" id="{2A3E433D-2AB8-5E83-A18C-0F85BA06AB7D}"/>
-              </a:ext>
-            </a:extLst>
-          </p:cNvPr>
+          <p:cNvPr id="2" name="Title 1"/>
           <p:cNvSpPr>
             <a:spLocks noGrp="1"/>
           </p:cNvSpPr>
@@ -10965,345 +11133,131 @@
         </p:nvSpPr>
         <p:spPr>
           <a:xfrm>
-            <a:off x="913795" y="609600"/>
-            <a:ext cx="10353762" cy="741028"/>
+            <a:off x="5369441" y="8584"/>
+            <a:ext cx="5898114" cy="1357422"/>
+          </a:xfrm>
+        </p:spPr>
+        <p:txBody>
+          <a:bodyPr>
+            <a:normAutofit/>
+          </a:bodyPr>
+          <a:lstStyle/>
+          <a:p>
+            <a:r>
+              <a:rPr lang="en-US" dirty="0"/>
+              <a:t>Conclusion</a:t>
+            </a:r>
+          </a:p>
+        </p:txBody>
+      </p:sp>
+      <p:sp>
+        <p:nvSpPr>
+          <p:cNvPr id="3" name="Subtitle 2" descr="Tag=AccentColor&#10;Flavor=Light&#10;Target=Text"/>
+          <p:cNvSpPr>
+            <a:spLocks noGrp="1"/>
+          </p:cNvSpPr>
+          <p:nvPr>
+            <p:ph type="subTitle" idx="13"/>
+          </p:nvPr>
+        </p:nvSpPr>
+        <p:spPr>
+          <a:xfrm>
+            <a:off x="5369440" y="1494638"/>
+            <a:ext cx="5898115" cy="4276988"/>
+          </a:xfrm>
+        </p:spPr>
+        <p:txBody>
+          <a:bodyPr>
+            <a:normAutofit/>
+          </a:bodyPr>
+          <a:lstStyle/>
+          <a:p>
+            <a:r>
+              <a:rPr lang="en-US" dirty="0"/>
+              <a:t>Again, we want to take note that some data for 2008 needed to be extrapolated, and it may not necessarily be the exact data that would have been reported for the 2008 fiscal year. As a result, this may have presented a bias while training our dataset.</a:t>
+            </a:r>
+          </a:p>
+          <a:p>
+            <a:r>
+              <a:rPr lang="en-US" dirty="0"/>
+              <a:t>Nonetheless, through this study, we conclude that Starbucks is indeed deserving of its reputation. 2008 was dubbed “The Great Recession” and 2022 was the beginning of another economic downturn. Even during these years, the stock price of Starbucks held at a reasonable rate and has steadily increased in all other years.</a:t>
+            </a:r>
+          </a:p>
+        </p:txBody>
+      </p:sp>
+      <p:pic>
+        <p:nvPicPr>
+          <p:cNvPr id="17" name="Picture Placeholder 16" descr="A person in a suit reading">
+            <a:extLst>
+              <a:ext uri="{FF2B5EF4-FFF2-40B4-BE49-F238E27FC236}">
+                <a16:creationId xmlns:a16="http://schemas.microsoft.com/office/drawing/2014/main" id="{A2D17E8B-7A48-40BF-8132-27E5B0DBE65E}"/>
+              </a:ext>
+            </a:extLst>
+          </p:cNvPr>
+          <p:cNvPicPr>
+            <a:picLocks noGrp="1" noChangeAspect="1"/>
+          </p:cNvPicPr>
+          <p:nvPr>
+            <p:ph type="pic" sz="quarter" idx="14"/>
+          </p:nvPr>
+        </p:nvPicPr>
+        <p:blipFill rotWithShape="1">
+          <a:blip r:embed="rId3" cstate="screen">
+            <a:extLst>
+              <a:ext uri="{28A0092B-C50C-407E-A947-70E740481C1C}">
+                <a14:useLocalDpi xmlns:a14="http://schemas.microsoft.com/office/drawing/2010/main" val="0"/>
+              </a:ext>
+            </a:extLst>
+          </a:blip>
+          <a:srcRect/>
+          <a:stretch/>
+        </p:blipFill>
+        <p:spPr>
+          <a:xfrm>
+            <a:off x="-11113" y="0"/>
+            <a:ext cx="4583113" cy="6858000"/>
+          </a:xfrm>
+        </p:spPr>
+      </p:pic>
+      <p:sp>
+        <p:nvSpPr>
+          <p:cNvPr id="19" name="Slide Number Placeholder 5">
+            <a:extLst>
+              <a:ext uri="{FF2B5EF4-FFF2-40B4-BE49-F238E27FC236}">
+                <a16:creationId xmlns:a16="http://schemas.microsoft.com/office/drawing/2014/main" id="{0F1BC668-CEDC-414E-9BE5-D2234A944056}"/>
+              </a:ext>
+            </a:extLst>
+          </p:cNvPr>
+          <p:cNvSpPr>
+            <a:spLocks noGrp="1"/>
+          </p:cNvSpPr>
+          <p:nvPr>
+            <p:ph type="sldNum" sz="quarter" idx="12"/>
+          </p:nvPr>
+        </p:nvSpPr>
+        <p:spPr>
+          <a:xfrm>
+            <a:off x="10514011" y="6000749"/>
+            <a:ext cx="753545" cy="365125"/>
           </a:xfrm>
         </p:spPr>
         <p:txBody>
           <a:bodyPr/>
           <a:lstStyle/>
           <a:p>
-            <a:pPr algn="l"/>
-            <a:r>
-              <a:rPr lang="en-US"/>
-              <a:t>Data Testing</a:t>
-            </a:r>
-            <a:endParaRPr lang="en-US" dirty="0"/>
-          </a:p>
-        </p:txBody>
-      </p:sp>
-      <p:sp>
-        <p:nvSpPr>
-          <p:cNvPr id="6" name="Slide Number Placeholder 5">
-            <a:extLst>
-              <a:ext uri="{FF2B5EF4-FFF2-40B4-BE49-F238E27FC236}">
-                <a16:creationId xmlns:a16="http://schemas.microsoft.com/office/drawing/2014/main" id="{A98916E5-29CF-D8B7-0279-C5800AD5D653}"/>
-              </a:ext>
-            </a:extLst>
-          </p:cNvPr>
-          <p:cNvSpPr>
-            <a:spLocks noGrp="1"/>
-          </p:cNvSpPr>
-          <p:nvPr>
-            <p:ph type="sldNum" sz="quarter" idx="12"/>
-          </p:nvPr>
-        </p:nvSpPr>
-        <p:spPr/>
-        <p:txBody>
-          <a:bodyPr/>
-          <a:lstStyle/>
-          <a:p>
             <a:fld id="{3A98EE3D-8CD1-4C3F-BD1C-C98C9596463C}" type="slidenum">
               <a:rPr lang="en-US" smtClean="0"/>
+              <a:pPr/>
               <a:t>22</a:t>
             </a:fld>
             <a:endParaRPr lang="en-US" dirty="0"/>
           </a:p>
         </p:txBody>
       </p:sp>
-      <p:sp>
-        <p:nvSpPr>
-          <p:cNvPr id="7" name="TextBox 6">
-            <a:extLst>
-              <a:ext uri="{FF2B5EF4-FFF2-40B4-BE49-F238E27FC236}">
-                <a16:creationId xmlns:a16="http://schemas.microsoft.com/office/drawing/2014/main" id="{A02DC54F-6466-9192-3FB3-3DAB4176FEA8}"/>
-              </a:ext>
-            </a:extLst>
-          </p:cNvPr>
-          <p:cNvSpPr txBox="1"/>
-          <p:nvPr/>
-        </p:nvSpPr>
-        <p:spPr>
-          <a:xfrm>
-            <a:off x="913795" y="1295904"/>
-            <a:ext cx="3733706" cy="369332"/>
-          </a:xfrm>
-          <a:prstGeom prst="rect">
-            <a:avLst/>
-          </a:prstGeom>
-          <a:noFill/>
-        </p:spPr>
-        <p:txBody>
-          <a:bodyPr wrap="square" rtlCol="0">
-            <a:spAutoFit/>
-          </a:bodyPr>
-          <a:lstStyle/>
-          <a:p>
-            <a:r>
-              <a:rPr lang="en-US" dirty="0">
-                <a:latin typeface="+mj-lt"/>
-              </a:rPr>
-              <a:t>Resulting Predictions</a:t>
-            </a:r>
-          </a:p>
-        </p:txBody>
-      </p:sp>
-      <p:sp>
-        <p:nvSpPr>
-          <p:cNvPr id="8" name="Content Placeholder 7">
-            <a:extLst>
-              <a:ext uri="{FF2B5EF4-FFF2-40B4-BE49-F238E27FC236}">
-                <a16:creationId xmlns:a16="http://schemas.microsoft.com/office/drawing/2014/main" id="{434C175F-ED20-7DD8-6A87-8D1868330982}"/>
-              </a:ext>
-            </a:extLst>
-          </p:cNvPr>
-          <p:cNvSpPr>
-            <a:spLocks noGrp="1"/>
-          </p:cNvSpPr>
-          <p:nvPr>
-            <p:ph idx="1"/>
-          </p:nvPr>
-        </p:nvSpPr>
-        <p:spPr>
-          <a:xfrm>
-            <a:off x="913795" y="1757668"/>
-            <a:ext cx="10353762" cy="3714749"/>
-          </a:xfrm>
-        </p:spPr>
-        <p:txBody>
-          <a:bodyPr/>
-          <a:lstStyle/>
-          <a:p>
-            <a:r>
-              <a:rPr lang="en-US" dirty="0"/>
-              <a:t>Predictions are in line with the training model</a:t>
-            </a:r>
-          </a:p>
-          <a:p>
-            <a:r>
-              <a:rPr lang="en-US" dirty="0"/>
-              <a:t>Correctly predicted the direction of the stock prices of both years in the dataset</a:t>
-            </a:r>
-          </a:p>
-        </p:txBody>
-      </p:sp>
-      <p:grpSp>
-        <p:nvGrpSpPr>
-          <p:cNvPr id="14" name="Group 13">
-            <a:extLst>
-              <a:ext uri="{FF2B5EF4-FFF2-40B4-BE49-F238E27FC236}">
-                <a16:creationId xmlns:a16="http://schemas.microsoft.com/office/drawing/2014/main" id="{FA0AB1EF-0C41-6714-39AF-2ABDD84B9B5B}"/>
-              </a:ext>
-            </a:extLst>
-          </p:cNvPr>
-          <p:cNvGrpSpPr/>
-          <p:nvPr/>
-        </p:nvGrpSpPr>
-        <p:grpSpPr>
-          <a:xfrm>
-            <a:off x="1868457" y="2625754"/>
-            <a:ext cx="8500336" cy="640255"/>
-            <a:chOff x="1868457" y="2625754"/>
-            <a:chExt cx="8500336" cy="640255"/>
-          </a:xfrm>
-        </p:grpSpPr>
-        <p:pic>
-          <p:nvPicPr>
-            <p:cNvPr id="11" name="Picture 10">
-              <a:extLst>
-                <a:ext uri="{FF2B5EF4-FFF2-40B4-BE49-F238E27FC236}">
-                  <a16:creationId xmlns:a16="http://schemas.microsoft.com/office/drawing/2014/main" id="{7CF67D2B-9F0F-B51B-5A69-53D1CDDBCD97}"/>
-                </a:ext>
-              </a:extLst>
-            </p:cNvPr>
-            <p:cNvPicPr>
-              <a:picLocks noChangeAspect="1"/>
-            </p:cNvPicPr>
-            <p:nvPr/>
-          </p:nvPicPr>
-          <p:blipFill>
-            <a:blip r:embed="rId2"/>
-            <a:stretch>
-              <a:fillRect/>
-            </a:stretch>
-          </p:blipFill>
-          <p:spPr>
-            <a:xfrm>
-              <a:off x="1868457" y="2714027"/>
-              <a:ext cx="8444438" cy="438672"/>
-            </a:xfrm>
-            <a:prstGeom prst="rect">
-              <a:avLst/>
-            </a:prstGeom>
-          </p:spPr>
-        </p:pic>
-        <p:sp>
-          <p:nvSpPr>
-            <p:cNvPr id="13" name="Oval 12">
-              <a:extLst>
-                <a:ext uri="{FF2B5EF4-FFF2-40B4-BE49-F238E27FC236}">
-                  <a16:creationId xmlns:a16="http://schemas.microsoft.com/office/drawing/2014/main" id="{79CD7281-02E5-343F-E0E6-24F38DCA9734}"/>
-                </a:ext>
-              </a:extLst>
-            </p:cNvPr>
-            <p:cNvSpPr/>
-            <p:nvPr/>
-          </p:nvSpPr>
-          <p:spPr>
-            <a:xfrm>
-              <a:off x="9957732" y="2625754"/>
-              <a:ext cx="411061" cy="640255"/>
-            </a:xfrm>
-            <a:prstGeom prst="ellipse">
-              <a:avLst/>
-            </a:prstGeom>
-            <a:noFill/>
-            <a:ln>
-              <a:solidFill>
-                <a:srgbClr val="FF0000"/>
-              </a:solidFill>
-            </a:ln>
-          </p:spPr>
-          <p:style>
-            <a:lnRef idx="2">
-              <a:schemeClr val="accent1">
-                <a:shade val="50000"/>
-              </a:schemeClr>
-            </a:lnRef>
-            <a:fillRef idx="1">
-              <a:schemeClr val="accent1"/>
-            </a:fillRef>
-            <a:effectRef idx="0">
-              <a:schemeClr val="accent1"/>
-            </a:effectRef>
-            <a:fontRef idx="minor">
-              <a:schemeClr val="lt1"/>
-            </a:fontRef>
-          </p:style>
-          <p:txBody>
-            <a:bodyPr rtlCol="0" anchor="ctr"/>
-            <a:lstStyle/>
-            <a:p>
-              <a:pPr algn="ctr"/>
-              <a:endParaRPr lang="en-US"/>
-            </a:p>
-          </p:txBody>
-        </p:sp>
-      </p:grpSp>
-      <p:grpSp>
-        <p:nvGrpSpPr>
-          <p:cNvPr id="16" name="Group 15">
-            <a:extLst>
-              <a:ext uri="{FF2B5EF4-FFF2-40B4-BE49-F238E27FC236}">
-                <a16:creationId xmlns:a16="http://schemas.microsoft.com/office/drawing/2014/main" id="{A2294EC1-AD19-6686-9717-CAFB7BC83D53}"/>
-              </a:ext>
-            </a:extLst>
-          </p:cNvPr>
-          <p:cNvGrpSpPr/>
-          <p:nvPr/>
-        </p:nvGrpSpPr>
-        <p:grpSpPr>
-          <a:xfrm>
-            <a:off x="3472934" y="3282787"/>
-            <a:ext cx="5246132" cy="3361294"/>
-            <a:chOff x="3472934" y="3282787"/>
-            <a:chExt cx="5246132" cy="3361294"/>
-          </a:xfrm>
-        </p:grpSpPr>
-        <p:pic>
-          <p:nvPicPr>
-            <p:cNvPr id="9" name="Content Placeholder 3" descr="Text">
-              <a:extLst>
-                <a:ext uri="{FF2B5EF4-FFF2-40B4-BE49-F238E27FC236}">
-                  <a16:creationId xmlns:a16="http://schemas.microsoft.com/office/drawing/2014/main" id="{6DBEA8CD-DB8A-6157-797A-DB54D5165BB1}"/>
-                </a:ext>
-              </a:extLst>
-            </p:cNvPr>
-            <p:cNvPicPr>
-              <a:picLocks noChangeAspect="1"/>
-            </p:cNvPicPr>
-            <p:nvPr/>
-          </p:nvPicPr>
-          <p:blipFill>
-            <a:blip r:embed="rId3"/>
-            <a:stretch>
-              <a:fillRect/>
-            </a:stretch>
-          </p:blipFill>
-          <p:spPr>
-            <a:xfrm>
-              <a:off x="3472934" y="3282787"/>
-              <a:ext cx="5246132" cy="3310960"/>
-            </a:xfrm>
-            <a:prstGeom prst="rect">
-              <a:avLst/>
-            </a:prstGeom>
-            <a:effectLst>
-              <a:outerShdw blurRad="25400" dir="17880000">
-                <a:srgbClr val="000000">
-                  <a:alpha val="46000"/>
-                </a:srgbClr>
-              </a:outerShdw>
-            </a:effectLst>
-          </p:spPr>
-        </p:pic>
-        <p:sp>
-          <p:nvSpPr>
-            <p:cNvPr id="15" name="Oval 14">
-              <a:extLst>
-                <a:ext uri="{FF2B5EF4-FFF2-40B4-BE49-F238E27FC236}">
-                  <a16:creationId xmlns:a16="http://schemas.microsoft.com/office/drawing/2014/main" id="{B3AD8896-83AF-ADD0-13F1-55A93AA7A567}"/>
-                </a:ext>
-              </a:extLst>
-            </p:cNvPr>
-            <p:cNvSpPr/>
-            <p:nvPr/>
-          </p:nvSpPr>
-          <p:spPr>
-            <a:xfrm>
-              <a:off x="4001549" y="6298734"/>
-              <a:ext cx="855677" cy="345347"/>
-            </a:xfrm>
-            <a:prstGeom prst="ellipse">
-              <a:avLst/>
-            </a:prstGeom>
-            <a:noFill/>
-            <a:ln>
-              <a:solidFill>
-                <a:srgbClr val="FF0000"/>
-              </a:solidFill>
-            </a:ln>
-          </p:spPr>
-          <p:style>
-            <a:lnRef idx="2">
-              <a:schemeClr val="accent1">
-                <a:shade val="50000"/>
-              </a:schemeClr>
-            </a:lnRef>
-            <a:fillRef idx="1">
-              <a:schemeClr val="accent1"/>
-            </a:fillRef>
-            <a:effectRef idx="0">
-              <a:schemeClr val="accent1"/>
-            </a:effectRef>
-            <a:fontRef idx="minor">
-              <a:schemeClr val="lt1"/>
-            </a:fontRef>
-          </p:style>
-          <p:txBody>
-            <a:bodyPr rtlCol="0" anchor="ctr"/>
-            <a:lstStyle/>
-            <a:p>
-              <a:pPr algn="ctr"/>
-              <a:endParaRPr lang="en-US"/>
-            </a:p>
-          </p:txBody>
-        </p:sp>
-      </p:grpSp>
     </p:spTree>
     <p:extLst>
       <p:ext uri="{BB962C8B-B14F-4D97-AF65-F5344CB8AC3E}">
-        <p14:creationId xmlns:p14="http://schemas.microsoft.com/office/powerpoint/2010/main" val="238399427"/>
+        <p14:creationId xmlns:p14="http://schemas.microsoft.com/office/powerpoint/2010/main" val="3831612662"/>
       </p:ext>
     </p:extLst>
   </p:cSld>
@@ -11332,18 +11286,24 @@
       </p:grpSpPr>
       <p:sp>
         <p:nvSpPr>
-          <p:cNvPr id="2" name="Title 1"/>
-          <p:cNvSpPr>
-            <a:spLocks noGrp="1"/>
-          </p:cNvSpPr>
-          <p:nvPr>
-            <p:ph type="title"/>
-          </p:nvPr>
-        </p:nvSpPr>
-        <p:spPr>
-          <a:xfrm>
-            <a:off x="5369441" y="8584"/>
-            <a:ext cx="5898114" cy="1357422"/>
+          <p:cNvPr id="3" name="Title 2">
+            <a:extLst>
+              <a:ext uri="{FF2B5EF4-FFF2-40B4-BE49-F238E27FC236}">
+                <a16:creationId xmlns:a16="http://schemas.microsoft.com/office/drawing/2014/main" id="{0FA58685-7801-7C9E-5133-3D044D7C75B7}"/>
+              </a:ext>
+            </a:extLst>
+          </p:cNvPr>
+          <p:cNvSpPr>
+            <a:spLocks noGrp="1"/>
+          </p:cNvSpPr>
+          <p:nvPr>
+            <p:ph type="ctrTitle"/>
+          </p:nvPr>
+        </p:nvSpPr>
+        <p:spPr>
+          <a:xfrm>
+            <a:off x="2263430" y="2186300"/>
+            <a:ext cx="7665140" cy="1847835"/>
           </a:xfrm>
         </p:spPr>
         <p:txBody>
@@ -11353,120 +11313,16 @@
           <a:lstStyle/>
           <a:p>
             <a:r>
-              <a:rPr lang="en-US" dirty="0"/>
-              <a:t>Conclusion</a:t>
-            </a:r>
-          </a:p>
-        </p:txBody>
-      </p:sp>
-      <p:sp>
-        <p:nvSpPr>
-          <p:cNvPr id="3" name="Subtitle 2" descr="Tag=AccentColor&#10;Flavor=Light&#10;Target=Text"/>
-          <p:cNvSpPr>
-            <a:spLocks noGrp="1"/>
-          </p:cNvSpPr>
-          <p:nvPr>
-            <p:ph type="subTitle" idx="13"/>
-          </p:nvPr>
-        </p:nvSpPr>
-        <p:spPr>
-          <a:xfrm>
-            <a:off x="5369440" y="1494638"/>
-            <a:ext cx="5898115" cy="4276988"/>
-          </a:xfrm>
-        </p:spPr>
-        <p:txBody>
-          <a:bodyPr>
-            <a:normAutofit/>
-          </a:bodyPr>
-          <a:lstStyle/>
-          <a:p>
-            <a:r>
-              <a:rPr lang="en-US" dirty="0"/>
-              <a:t>Again, we want to take note that some data for 2008 needed to be extrapolated, and it may not necessarily be the exact data that would have been reported for the 2008 fiscal year. As a result, this may have presented a bias while training our dataset.</a:t>
-            </a:r>
-          </a:p>
-          <a:p>
-            <a:r>
-              <a:rPr lang="en-US" dirty="0"/>
-              <a:t>Nonetheless, through this study, we conclude that Starbucks is indeed deserving of its reputation. 2008 was dubbed “The Great Recession” and 2022 was the beginning of another economic downturn. Even during these years, the stock price of Starbucks held at a reasonable rate and has steadily increased in all other years.</a:t>
-            </a:r>
-          </a:p>
-        </p:txBody>
-      </p:sp>
-      <p:pic>
-        <p:nvPicPr>
-          <p:cNvPr id="17" name="Picture Placeholder 16" descr="A person in a suit reading">
-            <a:extLst>
-              <a:ext uri="{FF2B5EF4-FFF2-40B4-BE49-F238E27FC236}">
-                <a16:creationId xmlns:a16="http://schemas.microsoft.com/office/drawing/2014/main" id="{A2D17E8B-7A48-40BF-8132-27E5B0DBE65E}"/>
-              </a:ext>
-            </a:extLst>
-          </p:cNvPr>
-          <p:cNvPicPr>
-            <a:picLocks noGrp="1" noChangeAspect="1"/>
-          </p:cNvPicPr>
-          <p:nvPr>
-            <p:ph type="pic" sz="quarter" idx="14"/>
-          </p:nvPr>
-        </p:nvPicPr>
-        <p:blipFill rotWithShape="1">
-          <a:blip r:embed="rId3" cstate="screen">
-            <a:extLst>
-              <a:ext uri="{28A0092B-C50C-407E-A947-70E740481C1C}">
-                <a14:useLocalDpi xmlns:a14="http://schemas.microsoft.com/office/drawing/2010/main" val="0"/>
-              </a:ext>
-            </a:extLst>
-          </a:blip>
-          <a:srcRect/>
-          <a:stretch/>
-        </p:blipFill>
-        <p:spPr>
-          <a:xfrm>
-            <a:off x="-11113" y="0"/>
-            <a:ext cx="4583113" cy="6858000"/>
-          </a:xfrm>
-        </p:spPr>
-      </p:pic>
-      <p:sp>
-        <p:nvSpPr>
-          <p:cNvPr id="19" name="Slide Number Placeholder 5">
-            <a:extLst>
-              <a:ext uri="{FF2B5EF4-FFF2-40B4-BE49-F238E27FC236}">
-                <a16:creationId xmlns:a16="http://schemas.microsoft.com/office/drawing/2014/main" id="{0F1BC668-CEDC-414E-9BE5-D2234A944056}"/>
-              </a:ext>
-            </a:extLst>
-          </p:cNvPr>
-          <p:cNvSpPr>
-            <a:spLocks noGrp="1"/>
-          </p:cNvSpPr>
-          <p:nvPr>
-            <p:ph type="sldNum" sz="quarter" idx="12"/>
-          </p:nvPr>
-        </p:nvSpPr>
-        <p:spPr>
-          <a:xfrm>
-            <a:off x="10514011" y="6000749"/>
-            <a:ext cx="753545" cy="365125"/>
-          </a:xfrm>
-        </p:spPr>
-        <p:txBody>
-          <a:bodyPr/>
-          <a:lstStyle/>
-          <a:p>
-            <a:fld id="{3A98EE3D-8CD1-4C3F-BD1C-C98C9596463C}" type="slidenum">
-              <a:rPr lang="en-US" smtClean="0"/>
-              <a:pPr/>
-              <a:t>23</a:t>
-            </a:fld>
-            <a:endParaRPr lang="en-US" dirty="0"/>
+              <a:rPr lang="en-US" sz="8000" dirty="0"/>
+              <a:t>Q &amp; A</a:t>
+            </a:r>
           </a:p>
         </p:txBody>
       </p:sp>
     </p:spTree>
     <p:extLst>
       <p:ext uri="{BB962C8B-B14F-4D97-AF65-F5344CB8AC3E}">
-        <p14:creationId xmlns:p14="http://schemas.microsoft.com/office/powerpoint/2010/main" val="3831612662"/>
+        <p14:creationId xmlns:p14="http://schemas.microsoft.com/office/powerpoint/2010/main" val="2216801467"/>
       </p:ext>
     </p:extLst>
   </p:cSld>
@@ -11493,71 +11349,6 @@
           <a:chExt cx="0" cy="0"/>
         </a:xfrm>
       </p:grpSpPr>
-      <p:sp>
-        <p:nvSpPr>
-          <p:cNvPr id="3" name="Title 2">
-            <a:extLst>
-              <a:ext uri="{FF2B5EF4-FFF2-40B4-BE49-F238E27FC236}">
-                <a16:creationId xmlns:a16="http://schemas.microsoft.com/office/drawing/2014/main" id="{0FA58685-7801-7C9E-5133-3D044D7C75B7}"/>
-              </a:ext>
-            </a:extLst>
-          </p:cNvPr>
-          <p:cNvSpPr>
-            <a:spLocks noGrp="1"/>
-          </p:cNvSpPr>
-          <p:nvPr>
-            <p:ph type="ctrTitle"/>
-          </p:nvPr>
-        </p:nvSpPr>
-        <p:spPr>
-          <a:xfrm>
-            <a:off x="2263430" y="2186300"/>
-            <a:ext cx="7665140" cy="1847835"/>
-          </a:xfrm>
-        </p:spPr>
-        <p:txBody>
-          <a:bodyPr>
-            <a:normAutofit/>
-          </a:bodyPr>
-          <a:lstStyle/>
-          <a:p>
-            <a:r>
-              <a:rPr lang="en-US" sz="8000" dirty="0"/>
-              <a:t>Q &amp; A</a:t>
-            </a:r>
-          </a:p>
-        </p:txBody>
-      </p:sp>
-    </p:spTree>
-    <p:extLst>
-      <p:ext uri="{BB962C8B-B14F-4D97-AF65-F5344CB8AC3E}">
-        <p14:creationId xmlns:p14="http://schemas.microsoft.com/office/powerpoint/2010/main" val="2216801467"/>
-      </p:ext>
-    </p:extLst>
-  </p:cSld>
-  <p:clrMapOvr>
-    <a:masterClrMapping/>
-  </p:clrMapOvr>
-</p:sld>
-</file>
-
-<file path=ppt/slides/slide25.xml><?xml version="1.0" encoding="utf-8"?>
-<p:sld xmlns:a="http://schemas.openxmlformats.org/drawingml/2006/main" xmlns:r="http://schemas.openxmlformats.org/officeDocument/2006/relationships" xmlns:p="http://schemas.openxmlformats.org/presentationml/2006/main">
-  <p:cSld>
-    <p:spTree>
-      <p:nvGrpSpPr>
-        <p:cNvPr id="1" name=""/>
-        <p:cNvGrpSpPr/>
-        <p:nvPr/>
-      </p:nvGrpSpPr>
-      <p:grpSpPr>
-        <a:xfrm>
-          <a:off x="0" y="0"/>
-          <a:ext cx="0" cy="0"/>
-          <a:chOff x="0" y="0"/>
-          <a:chExt cx="0" cy="0"/>
-        </a:xfrm>
-      </p:grpSpPr>
       <p:pic>
         <p:nvPicPr>
           <p:cNvPr id="23" name="Picture Placeholder 22" descr="A person sitting in a chair">
@@ -11715,7 +11506,7 @@
             <a:fld id="{3A98EE3D-8CD1-4C3F-BD1C-C98C9596463C}" type="slidenum">
               <a:rPr lang="en-US" smtClean="0"/>
               <a:pPr/>
-              <a:t>25</a:t>
+              <a:t>24</a:t>
             </a:fld>
             <a:endParaRPr lang="en-US" dirty="0"/>
           </a:p>
@@ -12201,6 +11992,20 @@
             <a:r>
               <a:rPr lang="en-US" dirty="0"/>
               <a:t>Information about menu prices, common ingredient prices, and inflation rates</a:t>
+            </a:r>
+          </a:p>
+          <a:p>
+            <a:r>
+              <a:rPr lang="en-US" dirty="0"/>
+              <a:t>Target feature: </a:t>
+            </a:r>
+            <a:r>
+              <a:rPr lang="en-US" b="1" i="1" dirty="0"/>
+              <a:t>Stock Direction </a:t>
+            </a:r>
+            <a:r>
+              <a:rPr lang="en-US" dirty="0"/>
+              <a:t>(upward or downward trend)</a:t>
             </a:r>
           </a:p>
         </p:txBody>
@@ -14262,25 +14067,6 @@
 </file>
 
 <file path=customXml/item1.xml><?xml version="1.0" encoding="utf-8"?>
-<p:properties xmlns:p="http://schemas.microsoft.com/office/2006/metadata/properties" xmlns:xsi="http://www.w3.org/2001/XMLSchema-instance" xmlns:pc="http://schemas.microsoft.com/office/infopath/2007/PartnerControls">
-  <documentManagement>
-    <Status xmlns="71af3243-3dd4-4a8d-8c0d-dd76da1f02a5">Not started</Status>
-    <_ip_UnifiedCompliancePolicyUIAction xmlns="http://schemas.microsoft.com/sharepoint/v3" xsi:nil="true"/>
-    <Image xmlns="71af3243-3dd4-4a8d-8c0d-dd76da1f02a5">
-      <Url xsi:nil="true"/>
-      <Description xsi:nil="true"/>
-    </Image>
-    <_ip_UnifiedCompliancePolicyProperties xmlns="http://schemas.microsoft.com/sharepoint/v3" xsi:nil="true"/>
-    <ImageTagsTaxHTField xmlns="71af3243-3dd4-4a8d-8c0d-dd76da1f02a5">
-      <Terms xmlns="http://schemas.microsoft.com/office/infopath/2007/PartnerControls"/>
-    </ImageTagsTaxHTField>
-    <TaxCatchAll xmlns="230e9df3-be65-4c73-a93b-d1236ebd677e"/>
-    <MediaServiceKeyPoints xmlns="71af3243-3dd4-4a8d-8c0d-dd76da1f02a5" xsi:nil="true"/>
-  </documentManagement>
-</p:properties>
-</file>
-
-<file path=customXml/item2.xml><?xml version="1.0" encoding="utf-8"?>
 <ct:contentTypeSchema xmlns:ct="http://schemas.microsoft.com/office/2006/metadata/contentType" xmlns:ma="http://schemas.microsoft.com/office/2006/metadata/properties/metaAttributes" ct:_="" ma:_="" ma:contentTypeName="Document" ma:contentTypeID="0x01010079F111ED35F8CC479449609E8A0923A6" ma:contentTypeVersion="20" ma:contentTypeDescription="Create a new document." ma:contentTypeScope="" ma:versionID="1267097ee5f5874adfcc408041ae252e">
   <xsd:schema xmlns:xsd="http://www.w3.org/2001/XMLSchema" xmlns:xs="http://www.w3.org/2001/XMLSchema" xmlns:p="http://schemas.microsoft.com/office/2006/metadata/properties" xmlns:ns1="http://schemas.microsoft.com/sharepoint/v3" xmlns:ns2="71af3243-3dd4-4a8d-8c0d-dd76da1f02a5" xmlns:ns3="16c05727-aa75-4e4a-9b5f-8a80a1165891" xmlns:ns4="230e9df3-be65-4c73-a93b-d1236ebd677e" targetNamespace="http://schemas.microsoft.com/office/2006/metadata/properties" ma:root="true" ma:fieldsID="395891a93df65b14727750f2c06c306c" ns1:_="" ns2:_="" ns3:_="" ns4:_="">
     <xsd:import namespace="http://schemas.microsoft.com/sharepoint/v3"/>
@@ -14556,6 +14342,25 @@
 </ct:contentTypeSchema>
 </file>
 
+<file path=customXml/item2.xml><?xml version="1.0" encoding="utf-8"?>
+<p:properties xmlns:p="http://schemas.microsoft.com/office/2006/metadata/properties" xmlns:xsi="http://www.w3.org/2001/XMLSchema-instance" xmlns:pc="http://schemas.microsoft.com/office/infopath/2007/PartnerControls">
+  <documentManagement>
+    <Status xmlns="71af3243-3dd4-4a8d-8c0d-dd76da1f02a5">Not started</Status>
+    <_ip_UnifiedCompliancePolicyUIAction xmlns="http://schemas.microsoft.com/sharepoint/v3" xsi:nil="true"/>
+    <Image xmlns="71af3243-3dd4-4a8d-8c0d-dd76da1f02a5">
+      <Url xsi:nil="true"/>
+      <Description xsi:nil="true"/>
+    </Image>
+    <_ip_UnifiedCompliancePolicyProperties xmlns="http://schemas.microsoft.com/sharepoint/v3" xsi:nil="true"/>
+    <ImageTagsTaxHTField xmlns="71af3243-3dd4-4a8d-8c0d-dd76da1f02a5">
+      <Terms xmlns="http://schemas.microsoft.com/office/infopath/2007/PartnerControls"/>
+    </ImageTagsTaxHTField>
+    <TaxCatchAll xmlns="230e9df3-be65-4c73-a93b-d1236ebd677e"/>
+    <MediaServiceKeyPoints xmlns="71af3243-3dd4-4a8d-8c0d-dd76da1f02a5" xsi:nil="true"/>
+  </documentManagement>
+</p:properties>
+</file>
+
 <file path=customXml/item3.xml><?xml version="1.0" encoding="utf-8"?>
 <?mso-contentType ?>
 <FormTemplates xmlns="http://schemas.microsoft.com/sharepoint/v3/contenttype/forms">
@@ -14566,25 +14371,6 @@
 </file>
 
 <file path=customXml/itemProps1.xml><?xml version="1.0" encoding="utf-8"?>
-<ds:datastoreItem xmlns:ds="http://schemas.openxmlformats.org/officeDocument/2006/customXml" ds:itemID="{DF06F3F2-9398-47DD-B339-5E062F7F29B5}">
-  <ds:schemaRefs>
-    <ds:schemaRef ds:uri="http://purl.org/dc/terms/"/>
-    <ds:schemaRef ds:uri="http://schemas.microsoft.com/sharepoint/v3"/>
-    <ds:schemaRef ds:uri="230e9df3-be65-4c73-a93b-d1236ebd677e"/>
-    <ds:schemaRef ds:uri="http://schemas.microsoft.com/office/2006/documentManagement/types"/>
-    <ds:schemaRef ds:uri="http://schemas.microsoft.com/office/infopath/2007/PartnerControls"/>
-    <ds:schemaRef ds:uri="http://purl.org/dc/dcmitype/"/>
-    <ds:schemaRef ds:uri="http://www.w3.org/XML/1998/namespace"/>
-    <ds:schemaRef ds:uri="http://purl.org/dc/elements/1.1/"/>
-    <ds:schemaRef ds:uri="71af3243-3dd4-4a8d-8c0d-dd76da1f02a5"/>
-    <ds:schemaRef ds:uri="http://schemas.openxmlformats.org/package/2006/metadata/core-properties"/>
-    <ds:schemaRef ds:uri="16c05727-aa75-4e4a-9b5f-8a80a1165891"/>
-    <ds:schemaRef ds:uri="http://schemas.microsoft.com/office/2006/metadata/properties"/>
-  </ds:schemaRefs>
-</ds:datastoreItem>
-</file>
-
-<file path=customXml/itemProps2.xml><?xml version="1.0" encoding="utf-8"?>
 <ds:datastoreItem xmlns:ds="http://schemas.openxmlformats.org/officeDocument/2006/customXml" ds:itemID="{80EF115D-73C4-4C20-A44F-97481CD74CD3}">
   <ds:schemaRefs>
     <ds:schemaRef ds:uri="http://schemas.microsoft.com/office/2006/metadata/contentType"/>
@@ -14605,6 +14391,25 @@
 </ds:datastoreItem>
 </file>
 
+<file path=customXml/itemProps2.xml><?xml version="1.0" encoding="utf-8"?>
+<ds:datastoreItem xmlns:ds="http://schemas.openxmlformats.org/officeDocument/2006/customXml" ds:itemID="{DF06F3F2-9398-47DD-B339-5E062F7F29B5}">
+  <ds:schemaRefs>
+    <ds:schemaRef ds:uri="http://purl.org/dc/terms/"/>
+    <ds:schemaRef ds:uri="http://schemas.microsoft.com/sharepoint/v3"/>
+    <ds:schemaRef ds:uri="230e9df3-be65-4c73-a93b-d1236ebd677e"/>
+    <ds:schemaRef ds:uri="http://schemas.microsoft.com/office/2006/documentManagement/types"/>
+    <ds:schemaRef ds:uri="http://schemas.microsoft.com/office/infopath/2007/PartnerControls"/>
+    <ds:schemaRef ds:uri="http://purl.org/dc/dcmitype/"/>
+    <ds:schemaRef ds:uri="http://www.w3.org/XML/1998/namespace"/>
+    <ds:schemaRef ds:uri="http://purl.org/dc/elements/1.1/"/>
+    <ds:schemaRef ds:uri="71af3243-3dd4-4a8d-8c0d-dd76da1f02a5"/>
+    <ds:schemaRef ds:uri="http://schemas.openxmlformats.org/package/2006/metadata/core-properties"/>
+    <ds:schemaRef ds:uri="16c05727-aa75-4e4a-9b5f-8a80a1165891"/>
+    <ds:schemaRef ds:uri="http://schemas.microsoft.com/office/2006/metadata/properties"/>
+  </ds:schemaRefs>
+</ds:datastoreItem>
+</file>
+
 <file path=customXml/itemProps3.xml><?xml version="1.0" encoding="utf-8"?>
 <ds:datastoreItem xmlns:ds="http://schemas.openxmlformats.org/officeDocument/2006/customXml" ds:itemID="{51D2C913-C7E9-427D-8C7B-4D2DB36F60BD}">
   <ds:schemaRefs>

</xml_diff>